<commit_message>
DelCo_2014: added for monitor/handline plotting to hose test plotting script, updated report drawings
</commit_message>
<xml_diff>
--- a/Projects/DelCo_2014/Report/Hose_Stream_Report/Drawings/Specific_Tests/All_Hose_Drawings.pptx
+++ b/Projects/DelCo_2014/Report/Hose_Stream_Report/Drawings/Specific_Tests/All_Hose_Drawings.pptx
@@ -9,6 +9,9 @@
     <p:sldId id="257" r:id="rId3"/>
     <p:sldId id="258" r:id="rId4"/>
     <p:sldId id="259" r:id="rId5"/>
+    <p:sldId id="260" r:id="rId6"/>
+    <p:sldId id="261" r:id="rId7"/>
+    <p:sldId id="262" r:id="rId8"/>
   </p:sldIdLst>
   <p:sldSz cx="9144000" cy="6858000" type="screen4x3"/>
   <p:notesSz cx="6858000" cy="9144000"/>
@@ -291,7 +294,7 @@
           <a:p>
             <a:fld id="{EC5F9EF9-5B5D-A84E-B5D8-04E2F59DA865}" type="datetimeFigureOut">
               <a:rPr lang="en-US" smtClean="0"/>
-              <a:t>9/23/15</a:t>
+              <a:t>10/2/15</a:t>
             </a:fld>
             <a:endParaRPr lang="en-US"/>
           </a:p>
@@ -461,7 +464,7 @@
           <a:p>
             <a:fld id="{EC5F9EF9-5B5D-A84E-B5D8-04E2F59DA865}" type="datetimeFigureOut">
               <a:rPr lang="en-US" smtClean="0"/>
-              <a:t>9/23/15</a:t>
+              <a:t>10/2/15</a:t>
             </a:fld>
             <a:endParaRPr lang="en-US"/>
           </a:p>
@@ -641,7 +644,7 @@
           <a:p>
             <a:fld id="{EC5F9EF9-5B5D-A84E-B5D8-04E2F59DA865}" type="datetimeFigureOut">
               <a:rPr lang="en-US" smtClean="0"/>
-              <a:t>9/23/15</a:t>
+              <a:t>10/2/15</a:t>
             </a:fld>
             <a:endParaRPr lang="en-US"/>
           </a:p>
@@ -811,7 +814,7 @@
           <a:p>
             <a:fld id="{EC5F9EF9-5B5D-A84E-B5D8-04E2F59DA865}" type="datetimeFigureOut">
               <a:rPr lang="en-US" smtClean="0"/>
-              <a:t>9/23/15</a:t>
+              <a:t>10/2/15</a:t>
             </a:fld>
             <a:endParaRPr lang="en-US"/>
           </a:p>
@@ -1057,7 +1060,7 @@
           <a:p>
             <a:fld id="{EC5F9EF9-5B5D-A84E-B5D8-04E2F59DA865}" type="datetimeFigureOut">
               <a:rPr lang="en-US" smtClean="0"/>
-              <a:t>9/23/15</a:t>
+              <a:t>10/2/15</a:t>
             </a:fld>
             <a:endParaRPr lang="en-US"/>
           </a:p>
@@ -1345,7 +1348,7 @@
           <a:p>
             <a:fld id="{EC5F9EF9-5B5D-A84E-B5D8-04E2F59DA865}" type="datetimeFigureOut">
               <a:rPr lang="en-US" smtClean="0"/>
-              <a:t>9/23/15</a:t>
+              <a:t>10/2/15</a:t>
             </a:fld>
             <a:endParaRPr lang="en-US"/>
           </a:p>
@@ -1767,7 +1770,7 @@
           <a:p>
             <a:fld id="{EC5F9EF9-5B5D-A84E-B5D8-04E2F59DA865}" type="datetimeFigureOut">
               <a:rPr lang="en-US" smtClean="0"/>
-              <a:t>9/23/15</a:t>
+              <a:t>10/2/15</a:t>
             </a:fld>
             <a:endParaRPr lang="en-US"/>
           </a:p>
@@ -1885,7 +1888,7 @@
           <a:p>
             <a:fld id="{EC5F9EF9-5B5D-A84E-B5D8-04E2F59DA865}" type="datetimeFigureOut">
               <a:rPr lang="en-US" smtClean="0"/>
-              <a:t>9/23/15</a:t>
+              <a:t>10/2/15</a:t>
             </a:fld>
             <a:endParaRPr lang="en-US"/>
           </a:p>
@@ -1980,7 +1983,7 @@
           <a:p>
             <a:fld id="{EC5F9EF9-5B5D-A84E-B5D8-04E2F59DA865}" type="datetimeFigureOut">
               <a:rPr lang="en-US" smtClean="0"/>
-              <a:t>9/23/15</a:t>
+              <a:t>10/2/15</a:t>
             </a:fld>
             <a:endParaRPr lang="en-US"/>
           </a:p>
@@ -2257,7 +2260,7 @@
           <a:p>
             <a:fld id="{EC5F9EF9-5B5D-A84E-B5D8-04E2F59DA865}" type="datetimeFigureOut">
               <a:rPr lang="en-US" smtClean="0"/>
-              <a:t>9/23/15</a:t>
+              <a:t>10/2/15</a:t>
             </a:fld>
             <a:endParaRPr lang="en-US"/>
           </a:p>
@@ -2510,7 +2513,7 @@
           <a:p>
             <a:fld id="{EC5F9EF9-5B5D-A84E-B5D8-04E2F59DA865}" type="datetimeFigureOut">
               <a:rPr lang="en-US" smtClean="0"/>
-              <a:t>9/23/15</a:t>
+              <a:t>10/2/15</a:t>
             </a:fld>
             <a:endParaRPr lang="en-US"/>
           </a:p>
@@ -2723,7 +2726,7 @@
           <a:p>
             <a:fld id="{EC5F9EF9-5B5D-A84E-B5D8-04E2F59DA865}" type="datetimeFigureOut">
               <a:rPr lang="en-US" smtClean="0"/>
-              <a:t>9/23/15</a:t>
+              <a:t>10/2/15</a:t>
             </a:fld>
             <a:endParaRPr lang="en-US"/>
           </a:p>
@@ -3432,94 +3435,194 @@
       </p:grpSpPr>
       <p:grpSp>
         <p:nvGrpSpPr>
-          <p:cNvPr id="22" name="Group 21"/>
+          <p:cNvPr id="14" name="Group 13"/>
           <p:cNvGrpSpPr/>
           <p:nvPr/>
         </p:nvGrpSpPr>
         <p:grpSpPr>
           <a:xfrm>
-            <a:off x="63500" y="976791"/>
-            <a:ext cx="9080500" cy="4902200"/>
-            <a:chOff x="63500" y="976791"/>
-            <a:chExt cx="9080500" cy="4902200"/>
+            <a:off x="61577" y="605220"/>
+            <a:ext cx="9090122" cy="5273771"/>
+            <a:chOff x="61577" y="605220"/>
+            <a:chExt cx="9090122" cy="5273771"/>
           </a:xfrm>
         </p:grpSpPr>
-        <p:pic>
-          <p:nvPicPr>
-            <p:cNvPr id="7" name="Picture 6" descr="West_Hose_Test_2nd_Floor_Annotated.pdf"/>
-            <p:cNvPicPr>
-              <a:picLocks noChangeAspect="1"/>
-            </p:cNvPicPr>
-            <p:nvPr/>
-          </p:nvPicPr>
-          <p:blipFill>
-            <a:blip r:embed="rId2">
-              <a:extLst>
-                <a:ext uri="{28A0092B-C50C-407E-A947-70E740481C1C}">
-                  <a14:useLocalDpi xmlns:a14="http://schemas.microsoft.com/office/drawing/2010/main" val="0"/>
-                </a:ext>
-              </a:extLst>
-            </a:blip>
-            <a:stretch>
-              <a:fillRect/>
-            </a:stretch>
-          </p:blipFill>
-          <p:spPr>
-            <a:xfrm>
-              <a:off x="63500" y="976791"/>
-              <a:ext cx="9080500" cy="4902200"/>
-            </a:xfrm>
-            <a:prstGeom prst="rect">
-              <a:avLst/>
-            </a:prstGeom>
-          </p:spPr>
-        </p:pic>
         <p:grpSp>
           <p:nvGrpSpPr>
-            <p:cNvPr id="21" name="Group 20"/>
+            <p:cNvPr id="22" name="Group 21"/>
             <p:cNvGrpSpPr/>
             <p:nvPr/>
           </p:nvGrpSpPr>
           <p:grpSpPr>
             <a:xfrm>
-              <a:off x="1118435" y="3174835"/>
-              <a:ext cx="7150673" cy="2193092"/>
-              <a:chOff x="1118435" y="3174835"/>
-              <a:chExt cx="7150673" cy="2193092"/>
+              <a:off x="61577" y="1138847"/>
+              <a:ext cx="9090122" cy="4740144"/>
+              <a:chOff x="61577" y="1138847"/>
+              <a:chExt cx="9090122" cy="4740144"/>
             </a:xfrm>
           </p:grpSpPr>
+          <p:pic>
+            <p:nvPicPr>
+              <p:cNvPr id="7" name="Picture 6" descr="West_Hose_Test_2nd_Floor_Annotated.pdf"/>
+              <p:cNvPicPr>
+                <a:picLocks noChangeAspect="1"/>
+              </p:cNvPicPr>
+              <p:nvPr/>
+            </p:nvPicPr>
+            <p:blipFill rotWithShape="1">
+              <a:blip r:embed="rId2">
+                <a:extLst>
+                  <a:ext uri="{28A0092B-C50C-407E-A947-70E740481C1C}">
+                    <a14:useLocalDpi xmlns:a14="http://schemas.microsoft.com/office/drawing/2010/main" val="0"/>
+                  </a:ext>
+                </a:extLst>
+              </a:blip>
+              <a:srcRect l="-3528"/>
+              <a:stretch/>
+            </p:blipFill>
+            <p:spPr>
+              <a:xfrm>
+                <a:off x="61577" y="1138847"/>
+                <a:ext cx="9090122" cy="4740144"/>
+              </a:xfrm>
+              <a:prstGeom prst="rect">
+                <a:avLst/>
+              </a:prstGeom>
+            </p:spPr>
+          </p:pic>
           <p:grpSp>
             <p:nvGrpSpPr>
-              <p:cNvPr id="11" name="Group 10"/>
+              <p:cNvPr id="21" name="Group 20"/>
               <p:cNvGrpSpPr/>
               <p:nvPr/>
             </p:nvGrpSpPr>
             <p:grpSpPr>
               <a:xfrm>
-                <a:off x="1118435" y="4772931"/>
-                <a:ext cx="2340528" cy="594996"/>
-                <a:chOff x="1118435" y="4772931"/>
-                <a:chExt cx="2340528" cy="594996"/>
+                <a:off x="1417410" y="3174835"/>
+                <a:ext cx="6851698" cy="2172183"/>
+                <a:chOff x="1417410" y="3174835"/>
+                <a:chExt cx="6851698" cy="2172183"/>
               </a:xfrm>
             </p:grpSpPr>
+            <p:grpSp>
+              <p:nvGrpSpPr>
+                <p:cNvPr id="11" name="Group 10"/>
+                <p:cNvGrpSpPr/>
+                <p:nvPr/>
+              </p:nvGrpSpPr>
+              <p:grpSpPr>
+                <a:xfrm>
+                  <a:off x="1417410" y="4648970"/>
+                  <a:ext cx="2194247" cy="698048"/>
+                  <a:chOff x="1417410" y="4648970"/>
+                  <a:chExt cx="2194247" cy="698048"/>
+                </a:xfrm>
+              </p:grpSpPr>
+              <p:cxnSp>
+                <p:nvCxnSpPr>
+                  <p:cNvPr id="8" name="Straight Connector 7"/>
+                  <p:cNvCxnSpPr/>
+                  <p:nvPr/>
+                </p:nvCxnSpPr>
+                <p:spPr>
+                  <a:xfrm flipH="1">
+                    <a:off x="1715178" y="5347018"/>
+                    <a:ext cx="1896479" cy="0"/>
+                  </a:xfrm>
+                  <a:prstGeom prst="line">
+                    <a:avLst/>
+                  </a:prstGeom>
+                  <a:ln w="57150" cmpd="sng">
+                    <a:solidFill>
+                      <a:srgbClr val="C00000"/>
+                    </a:solidFill>
+                  </a:ln>
+                  <a:effectLst/>
+                </p:spPr>
+                <p:style>
+                  <a:lnRef idx="2">
+                    <a:schemeClr val="accent1"/>
+                  </a:lnRef>
+                  <a:fillRef idx="0">
+                    <a:schemeClr val="accent1"/>
+                  </a:fillRef>
+                  <a:effectRef idx="1">
+                    <a:schemeClr val="accent1"/>
+                  </a:effectRef>
+                  <a:fontRef idx="minor">
+                    <a:schemeClr val="tx1"/>
+                  </a:fontRef>
+                </p:style>
+              </p:cxnSp>
+              <p:sp>
+                <p:nvSpPr>
+                  <p:cNvPr id="9" name="Arc 8"/>
+                  <p:cNvSpPr/>
+                  <p:nvPr/>
+                </p:nvSpPr>
+                <p:spPr>
+                  <a:xfrm rot="16200000">
+                    <a:off x="1367361" y="4699019"/>
+                    <a:ext cx="698048" cy="597950"/>
+                  </a:xfrm>
+                  <a:prstGeom prst="arc">
+                    <a:avLst>
+                      <a:gd name="adj1" fmla="val 10785660"/>
+                      <a:gd name="adj2" fmla="val 16025809"/>
+                    </a:avLst>
+                  </a:prstGeom>
+                  <a:ln w="57150" cap="rnd" cmpd="sng">
+                    <a:solidFill>
+                      <a:srgbClr val="C00000"/>
+                    </a:solidFill>
+                  </a:ln>
+                  <a:effectLst/>
+                </p:spPr>
+                <p:style>
+                  <a:lnRef idx="2">
+                    <a:schemeClr val="accent1"/>
+                  </a:lnRef>
+                  <a:fillRef idx="0">
+                    <a:schemeClr val="accent1"/>
+                  </a:fillRef>
+                  <a:effectRef idx="1">
+                    <a:schemeClr val="accent1"/>
+                  </a:effectRef>
+                  <a:fontRef idx="minor">
+                    <a:schemeClr val="tx1"/>
+                  </a:fontRef>
+                </p:style>
+                <p:txBody>
+                  <a:bodyPr rtlCol="0" anchor="ctr"/>
+                  <a:lstStyle/>
+                  <a:p>
+                    <a:pPr algn="ctr"/>
+                    <a:endParaRPr lang="en-US"/>
+                  </a:p>
+                </p:txBody>
+              </p:sp>
+            </p:grpSp>
             <p:cxnSp>
               <p:nvCxnSpPr>
-                <p:cNvPr id="8" name="Straight Connector 7"/>
+                <p:cNvPr id="18" name="Curved Connector 17"/>
                 <p:cNvCxnSpPr/>
                 <p:nvPr/>
               </p:nvCxnSpPr>
               <p:spPr>
-                <a:xfrm flipH="1">
-                  <a:off x="1417410" y="5367927"/>
-                  <a:ext cx="2041553" cy="0"/>
+                <a:xfrm flipV="1">
+                  <a:off x="4318000" y="3174835"/>
+                  <a:ext cx="3951108" cy="1948516"/>
                 </a:xfrm>
-                <a:prstGeom prst="line">
-                  <a:avLst/>
+                <a:prstGeom prst="curvedConnector3">
+                  <a:avLst>
+                    <a:gd name="adj1" fmla="val 50000"/>
+                  </a:avLst>
                 </a:prstGeom>
-                <a:ln w="57150" cmpd="sng">
+                <a:ln w="57150" cap="rnd" cmpd="sng">
                   <a:solidFill>
                     <a:srgbClr val="C00000"/>
                   </a:solidFill>
+                  <a:tailEnd type="arrow"/>
                 </a:ln>
                 <a:effectLst/>
               </p:spPr>
@@ -3538,94 +3641,37 @@
                 </a:fontRef>
               </p:style>
             </p:cxnSp>
-            <p:sp>
-              <p:nvSpPr>
-                <p:cNvPr id="9" name="Arc 8"/>
-                <p:cNvSpPr/>
-                <p:nvPr/>
-              </p:nvSpPr>
-              <p:spPr>
-                <a:xfrm rot="16200000">
-                  <a:off x="1119912" y="4771454"/>
-                  <a:ext cx="594996" cy="597950"/>
-                </a:xfrm>
-                <a:prstGeom prst="arc">
-                  <a:avLst>
-                    <a:gd name="adj1" fmla="val 10785660"/>
-                    <a:gd name="adj2" fmla="val 17309357"/>
-                  </a:avLst>
-                </a:prstGeom>
-                <a:ln w="57150" cap="rnd" cmpd="sng">
-                  <a:solidFill>
-                    <a:srgbClr val="C00000"/>
-                  </a:solidFill>
-                </a:ln>
-                <a:effectLst/>
-              </p:spPr>
-              <p:style>
-                <a:lnRef idx="2">
-                  <a:schemeClr val="accent1"/>
-                </a:lnRef>
-                <a:fillRef idx="0">
-                  <a:schemeClr val="accent1"/>
-                </a:fillRef>
-                <a:effectRef idx="1">
-                  <a:schemeClr val="accent1"/>
-                </a:effectRef>
-                <a:fontRef idx="minor">
-                  <a:schemeClr val="tx1"/>
-                </a:fontRef>
-              </p:style>
-              <p:txBody>
-                <a:bodyPr rtlCol="0" anchor="ctr"/>
-                <a:lstStyle/>
-                <a:p>
-                  <a:pPr algn="ctr"/>
-                  <a:endParaRPr lang="en-US"/>
-                </a:p>
-              </p:txBody>
-            </p:sp>
           </p:grpSp>
-          <p:cxnSp>
-            <p:nvCxnSpPr>
-              <p:cNvPr id="18" name="Curved Connector 17"/>
-              <p:cNvCxnSpPr/>
-              <p:nvPr/>
-            </p:nvCxnSpPr>
-            <p:spPr>
-              <a:xfrm flipV="1">
-                <a:off x="4145256" y="3174835"/>
-                <a:ext cx="4123852" cy="1948516"/>
-              </a:xfrm>
-              <a:prstGeom prst="curvedConnector3">
-                <a:avLst>
-                  <a:gd name="adj1" fmla="val 39965"/>
-                </a:avLst>
-              </a:prstGeom>
-              <a:ln w="57150" cap="rnd" cmpd="sng">
-                <a:solidFill>
-                  <a:srgbClr val="C00000"/>
-                </a:solidFill>
-                <a:tailEnd type="arrow"/>
-              </a:ln>
-              <a:effectLst/>
-            </p:spPr>
-            <p:style>
-              <a:lnRef idx="2">
-                <a:schemeClr val="accent1"/>
-              </a:lnRef>
-              <a:fillRef idx="0">
-                <a:schemeClr val="accent1"/>
-              </a:fillRef>
-              <a:effectRef idx="1">
-                <a:schemeClr val="accent1"/>
-              </a:effectRef>
-              <a:fontRef idx="minor">
-                <a:schemeClr val="tx1"/>
-              </a:fontRef>
-            </p:style>
-          </p:cxnSp>
         </p:grpSp>
+        <p:pic>
+          <p:nvPicPr>
+            <p:cNvPr id="10" name="Picture 9" descr="East_Hose_Test_Annotated.pdf"/>
+            <p:cNvPicPr>
+              <a:picLocks noChangeAspect="1"/>
+            </p:cNvPicPr>
+            <p:nvPr/>
+          </p:nvPicPr>
+          <p:blipFill rotWithShape="1">
+            <a:blip r:embed="rId3">
+              <a:extLst>
+                <a:ext uri="{28A0092B-C50C-407E-A947-70E740481C1C}">
+                  <a14:useLocalDpi xmlns:a14="http://schemas.microsoft.com/office/drawing/2010/main" val="0"/>
+                </a:ext>
+              </a:extLst>
+            </a:blip>
+            <a:srcRect l="90227" t="10873" r="2796" b="82699"/>
+            <a:stretch/>
+          </p:blipFill>
+          <p:spPr>
+            <a:xfrm>
+              <a:off x="8385716" y="605220"/>
+              <a:ext cx="619221" cy="440844"/>
+            </a:xfrm>
+            <a:prstGeom prst="rect">
+              <a:avLst/>
+            </a:prstGeom>
+          </p:spPr>
+        </p:pic>
       </p:grpSp>
     </p:spTree>
     <p:extLst>
@@ -3659,16 +3705,16 @@
       </p:grpSpPr>
       <p:grpSp>
         <p:nvGrpSpPr>
-          <p:cNvPr id="22" name="Group 21"/>
+          <p:cNvPr id="9" name="Group 8"/>
           <p:cNvGrpSpPr/>
           <p:nvPr/>
         </p:nvGrpSpPr>
         <p:grpSpPr>
           <a:xfrm>
-            <a:off x="0" y="1044517"/>
-            <a:ext cx="9144000" cy="5813483"/>
-            <a:chOff x="0" y="1044517"/>
-            <a:chExt cx="9144000" cy="5813483"/>
+            <a:off x="61576" y="1724121"/>
+            <a:ext cx="9144000" cy="5133879"/>
+            <a:chOff x="0" y="1724121"/>
+            <a:chExt cx="9144000" cy="5133879"/>
           </a:xfrm>
         </p:grpSpPr>
         <p:pic>
@@ -3679,7 +3725,7 @@
             </p:cNvPicPr>
             <p:nvPr/>
           </p:nvPicPr>
-          <p:blipFill>
+          <p:blipFill rotWithShape="1">
             <a:blip r:embed="rId2">
               <a:extLst>
                 <a:ext uri="{28A0092B-C50C-407E-A947-70E740481C1C}">
@@ -3687,14 +3733,13 @@
                 </a:ext>
               </a:extLst>
             </a:blip>
-            <a:stretch>
-              <a:fillRect/>
-            </a:stretch>
+            <a:srcRect t="11690"/>
+            <a:stretch/>
           </p:blipFill>
           <p:spPr>
             <a:xfrm>
-              <a:off x="0" y="1044517"/>
-              <a:ext cx="9144000" cy="5813483"/>
+              <a:off x="0" y="1724121"/>
+              <a:ext cx="9144000" cy="5133879"/>
             </a:xfrm>
             <a:prstGeom prst="rect">
               <a:avLst/>
@@ -3709,10 +3754,10 @@
           </p:nvGrpSpPr>
           <p:grpSpPr>
             <a:xfrm>
-              <a:off x="993563" y="4285440"/>
-              <a:ext cx="6478067" cy="1780586"/>
-              <a:chOff x="993563" y="4222720"/>
-              <a:chExt cx="6478067" cy="1843306"/>
+              <a:off x="646545" y="4285439"/>
+              <a:ext cx="6825087" cy="1780587"/>
+              <a:chOff x="646545" y="4222719"/>
+              <a:chExt cx="6825087" cy="1843307"/>
             </a:xfrm>
           </p:grpSpPr>
           <p:sp>
@@ -3802,15 +3847,13 @@
           <p:cxnSp>
             <p:nvCxnSpPr>
               <p:cNvPr id="16" name="Straight Connector 15"/>
-              <p:cNvCxnSpPr>
-                <a:endCxn id="6" idx="2"/>
-              </p:cNvCxnSpPr>
+              <p:cNvCxnSpPr/>
               <p:nvPr/>
             </p:nvCxnSpPr>
             <p:spPr>
-              <a:xfrm flipH="1">
-                <a:off x="2127270" y="4222720"/>
-                <a:ext cx="5344360" cy="207"/>
+              <a:xfrm flipH="1" flipV="1">
+                <a:off x="646545" y="4222719"/>
+                <a:ext cx="6825087" cy="4"/>
               </a:xfrm>
               <a:prstGeom prst="line">
                 <a:avLst/>
@@ -3819,6 +3862,7 @@
                 <a:solidFill>
                   <a:srgbClr val="C00000"/>
                 </a:solidFill>
+                <a:tailEnd type="arrow"/>
               </a:ln>
               <a:effectLst/>
             </p:spPr>
@@ -3900,16 +3944,16 @@
       </p:grpSpPr>
       <p:grpSp>
         <p:nvGrpSpPr>
-          <p:cNvPr id="10" name="Group 9"/>
+          <p:cNvPr id="2" name="Group 1"/>
           <p:cNvGrpSpPr/>
           <p:nvPr/>
         </p:nvGrpSpPr>
         <p:grpSpPr>
           <a:xfrm>
-            <a:off x="0" y="1059656"/>
-            <a:ext cx="9144000" cy="5798344"/>
-            <a:chOff x="0" y="1059656"/>
-            <a:chExt cx="9144000" cy="5798344"/>
+            <a:off x="1" y="1747212"/>
+            <a:ext cx="9144000" cy="5110788"/>
+            <a:chOff x="-284788" y="1747212"/>
+            <a:chExt cx="9144000" cy="5110788"/>
           </a:xfrm>
         </p:grpSpPr>
         <p:pic>
@@ -3920,7 +3964,7 @@
             </p:cNvPicPr>
             <p:nvPr/>
           </p:nvPicPr>
-          <p:blipFill>
+          <p:blipFill rotWithShape="1">
             <a:blip r:embed="rId2">
               <a:extLst>
                 <a:ext uri="{28A0092B-C50C-407E-A947-70E740481C1C}">
@@ -3928,14 +3972,13 @@
                 </a:ext>
               </a:extLst>
             </a:blip>
-            <a:stretch>
-              <a:fillRect/>
-            </a:stretch>
+            <a:srcRect l="-3115" t="11858" r="3114"/>
+            <a:stretch/>
           </p:blipFill>
           <p:spPr>
             <a:xfrm>
-              <a:off x="0" y="1059656"/>
-              <a:ext cx="9144000" cy="5798344"/>
+              <a:off x="-284788" y="1747212"/>
+              <a:ext cx="9144000" cy="5110788"/>
             </a:xfrm>
             <a:prstGeom prst="rect">
               <a:avLst/>
@@ -4113,6 +4156,229 @@
     <p:extLst>
       <p:ext uri="{BB962C8B-B14F-4D97-AF65-F5344CB8AC3E}">
         <p14:creationId xmlns:p14="http://schemas.microsoft.com/office/powerpoint/2010/main" val="1749013284"/>
+      </p:ext>
+    </p:extLst>
+  </p:cSld>
+  <p:clrMapOvr>
+    <a:masterClrMapping/>
+  </p:clrMapOvr>
+</p:sld>
+</file>
+
+<file path=ppt/slides/slide5.xml><?xml version="1.0" encoding="utf-8"?>
+<p:sld xmlns:a="http://schemas.openxmlformats.org/drawingml/2006/main" xmlns:r="http://schemas.openxmlformats.org/officeDocument/2006/relationships" xmlns:p="http://schemas.openxmlformats.org/presentationml/2006/main">
+  <p:cSld>
+    <p:spTree>
+      <p:nvGrpSpPr>
+        <p:cNvPr id="1" name=""/>
+        <p:cNvGrpSpPr/>
+        <p:nvPr/>
+      </p:nvGrpSpPr>
+      <p:grpSpPr>
+        <a:xfrm>
+          <a:off x="0" y="0"/>
+          <a:ext cx="0" cy="0"/>
+          <a:chOff x="0" y="0"/>
+          <a:chExt cx="0" cy="0"/>
+        </a:xfrm>
+      </p:grpSpPr>
+      <p:pic>
+        <p:nvPicPr>
+          <p:cNvPr id="4" name="Picture 3" descr="West_Test_Structure_1st_Floor_Dimensioned.pdf"/>
+          <p:cNvPicPr>
+            <a:picLocks noChangeAspect="1"/>
+          </p:cNvPicPr>
+          <p:nvPr/>
+        </p:nvPicPr>
+        <p:blipFill rotWithShape="1">
+          <a:blip r:embed="rId2">
+            <a:extLst>
+              <a:ext uri="{28A0092B-C50C-407E-A947-70E740481C1C}">
+                <a14:useLocalDpi xmlns:a14="http://schemas.microsoft.com/office/drawing/2010/main" val="0"/>
+              </a:ext>
+            </a:extLst>
+          </a:blip>
+          <a:srcRect t="6279"/>
+          <a:stretch/>
+        </p:blipFill>
+        <p:spPr>
+          <a:xfrm>
+            <a:off x="0" y="1485514"/>
+            <a:ext cx="9144000" cy="5372485"/>
+          </a:xfrm>
+          <a:prstGeom prst="rect">
+            <a:avLst/>
+          </a:prstGeom>
+        </p:spPr>
+      </p:pic>
+    </p:spTree>
+    <p:extLst>
+      <p:ext uri="{BB962C8B-B14F-4D97-AF65-F5344CB8AC3E}">
+        <p14:creationId xmlns:p14="http://schemas.microsoft.com/office/powerpoint/2010/main" val="793882019"/>
+      </p:ext>
+    </p:extLst>
+  </p:cSld>
+  <p:clrMapOvr>
+    <a:masterClrMapping/>
+  </p:clrMapOvr>
+</p:sld>
+</file>
+
+<file path=ppt/slides/slide6.xml><?xml version="1.0" encoding="utf-8"?>
+<p:sld xmlns:a="http://schemas.openxmlformats.org/drawingml/2006/main" xmlns:r="http://schemas.openxmlformats.org/officeDocument/2006/relationships" xmlns:p="http://schemas.openxmlformats.org/presentationml/2006/main">
+  <p:cSld>
+    <p:spTree>
+      <p:nvGrpSpPr>
+        <p:cNvPr id="1" name=""/>
+        <p:cNvGrpSpPr/>
+        <p:nvPr/>
+      </p:nvGrpSpPr>
+      <p:grpSpPr>
+        <a:xfrm>
+          <a:off x="0" y="0"/>
+          <a:ext cx="0" cy="0"/>
+          <a:chOff x="0" y="0"/>
+          <a:chExt cx="0" cy="0"/>
+        </a:xfrm>
+      </p:grpSpPr>
+      <p:grpSp>
+        <p:nvGrpSpPr>
+          <p:cNvPr id="6" name="Group 5"/>
+          <p:cNvGrpSpPr/>
+          <p:nvPr/>
+        </p:nvGrpSpPr>
+        <p:grpSpPr>
+          <a:xfrm>
+            <a:off x="0" y="1275528"/>
+            <a:ext cx="9228149" cy="5582472"/>
+            <a:chOff x="0" y="1275528"/>
+            <a:chExt cx="9228149" cy="5582472"/>
+          </a:xfrm>
+        </p:grpSpPr>
+        <p:pic>
+          <p:nvPicPr>
+            <p:cNvPr id="4" name="Picture 3" descr="West_Test_Structure_2nd_Floor_Dimensioned.pdf"/>
+            <p:cNvPicPr>
+              <a:picLocks noChangeAspect="1"/>
+            </p:cNvPicPr>
+            <p:nvPr/>
+          </p:nvPicPr>
+          <p:blipFill>
+            <a:blip r:embed="rId2">
+              <a:extLst>
+                <a:ext uri="{28A0092B-C50C-407E-A947-70E740481C1C}">
+                  <a14:useLocalDpi xmlns:a14="http://schemas.microsoft.com/office/drawing/2010/main" val="0"/>
+                </a:ext>
+              </a:extLst>
+            </a:blip>
+            <a:stretch>
+              <a:fillRect/>
+            </a:stretch>
+          </p:blipFill>
+          <p:spPr>
+            <a:xfrm>
+              <a:off x="0" y="1716372"/>
+              <a:ext cx="8751455" cy="5141628"/>
+            </a:xfrm>
+            <a:prstGeom prst="rect">
+              <a:avLst/>
+            </a:prstGeom>
+          </p:spPr>
+        </p:pic>
+        <p:pic>
+          <p:nvPicPr>
+            <p:cNvPr id="5" name="Picture 4" descr="East_Hose_Test_Annotated.pdf"/>
+            <p:cNvPicPr>
+              <a:picLocks noChangeAspect="1"/>
+            </p:cNvPicPr>
+            <p:nvPr/>
+          </p:nvPicPr>
+          <p:blipFill rotWithShape="1">
+            <a:blip r:embed="rId3">
+              <a:extLst>
+                <a:ext uri="{28A0092B-C50C-407E-A947-70E740481C1C}">
+                  <a14:useLocalDpi xmlns:a14="http://schemas.microsoft.com/office/drawing/2010/main" val="0"/>
+                </a:ext>
+              </a:extLst>
+            </a:blip>
+            <a:srcRect l="90227" t="10873" r="2796" b="82699"/>
+            <a:stretch/>
+          </p:blipFill>
+          <p:spPr>
+            <a:xfrm>
+              <a:off x="8608928" y="1275528"/>
+              <a:ext cx="619221" cy="440844"/>
+            </a:xfrm>
+            <a:prstGeom prst="rect">
+              <a:avLst/>
+            </a:prstGeom>
+          </p:spPr>
+        </p:pic>
+      </p:grpSp>
+    </p:spTree>
+    <p:extLst>
+      <p:ext uri="{BB962C8B-B14F-4D97-AF65-F5344CB8AC3E}">
+        <p14:creationId xmlns:p14="http://schemas.microsoft.com/office/powerpoint/2010/main" val="1369919620"/>
+      </p:ext>
+    </p:extLst>
+  </p:cSld>
+  <p:clrMapOvr>
+    <a:masterClrMapping/>
+  </p:clrMapOvr>
+</p:sld>
+</file>
+
+<file path=ppt/slides/slide7.xml><?xml version="1.0" encoding="utf-8"?>
+<p:sld xmlns:a="http://schemas.openxmlformats.org/drawingml/2006/main" xmlns:r="http://schemas.openxmlformats.org/officeDocument/2006/relationships" xmlns:p="http://schemas.openxmlformats.org/presentationml/2006/main">
+  <p:cSld>
+    <p:spTree>
+      <p:nvGrpSpPr>
+        <p:cNvPr id="1" name=""/>
+        <p:cNvGrpSpPr/>
+        <p:nvPr/>
+      </p:nvGrpSpPr>
+      <p:grpSpPr>
+        <a:xfrm>
+          <a:off x="0" y="0"/>
+          <a:ext cx="0" cy="0"/>
+          <a:chOff x="0" y="0"/>
+          <a:chExt cx="0" cy="0"/>
+        </a:xfrm>
+      </p:grpSpPr>
+      <p:pic>
+        <p:nvPicPr>
+          <p:cNvPr id="4" name="Picture 3" descr="East_Test_Structure_Dimensioned.pdf"/>
+          <p:cNvPicPr>
+            <a:picLocks noChangeAspect="1"/>
+          </p:cNvPicPr>
+          <p:nvPr/>
+        </p:nvPicPr>
+        <p:blipFill>
+          <a:blip r:embed="rId2">
+            <a:extLst>
+              <a:ext uri="{28A0092B-C50C-407E-A947-70E740481C1C}">
+                <a14:useLocalDpi xmlns:a14="http://schemas.microsoft.com/office/drawing/2010/main" val="0"/>
+              </a:ext>
+            </a:extLst>
+          </a:blip>
+          <a:stretch>
+            <a:fillRect/>
+          </a:stretch>
+        </p:blipFill>
+        <p:spPr>
+          <a:xfrm>
+            <a:off x="0" y="858701"/>
+            <a:ext cx="9144000" cy="5999299"/>
+          </a:xfrm>
+          <a:prstGeom prst="rect">
+            <a:avLst/>
+          </a:prstGeom>
+        </p:spPr>
+      </p:pic>
+    </p:spTree>
+    <p:extLst>
+      <p:ext uri="{BB962C8B-B14F-4D97-AF65-F5344CB8AC3E}">
+        <p14:creationId xmlns:p14="http://schemas.microsoft.com/office/powerpoint/2010/main" val="30791393"/>
       </p:ext>
     </p:extLst>
   </p:cSld>

</xml_diff>